<commit_message>
Creación de un informe básico
</commit_message>
<xml_diff>
--- a/05_Presentacion/Presentacion_Exit-To.pptx
+++ b/05_Presentacion/Presentacion_Exit-To.pptx
@@ -9,6 +9,7 @@
     <p:sldId id="257" r:id="rId3"/>
     <p:sldId id="258" r:id="rId4"/>
     <p:sldId id="259" r:id="rId5"/>
+    <p:sldId id="260" r:id="rId6"/>
   </p:sldIdLst>
   <p:sldSz cx="9144000" cy="5143500" type="screen16x9"/>
   <p:notesSz cx="6858000" cy="9144000"/>
@@ -3397,6 +3398,83 @@
       <p:pic>
         <p:nvPicPr>
           <p:cNvPr descr="Presentacion_Exit-To_files/figure-pptx/unnamed-chunk-3-1.png" id="0" name="Picture 1"/>
+          <p:cNvPicPr>
+            <a:picLocks noGrp="1" noChangeAspect="1"/>
+          </p:cNvPicPr>
+          <p:nvPr/>
+        </p:nvPicPr>
+        <p:blipFill>
+          <a:blip r:embed="rId2"/>
+          <a:stretch>
+            <a:fillRect/>
+          </a:stretch>
+        </p:blipFill>
+        <p:spPr bwMode="auto">
+          <a:xfrm>
+            <a:off x="2451100" y="1193800"/>
+            <a:ext cx="4241800" cy="3390900"/>
+          </a:xfrm>
+          <a:prstGeom prst="rect">
+            <a:avLst/>
+          </a:prstGeom>
+          <a:noFill/>
+          <a:ln w="9525">
+            <a:noFill/>
+            <a:headEnd/>
+            <a:tailEnd/>
+          </a:ln>
+        </p:spPr>
+      </p:pic>
+    </p:spTree>
+  </p:cSld>
+</p:sld>
+</file>
+
+<file path=ppt/slides/slide5.xml><?xml version="1.0" encoding="utf-8"?>
+<p:sld xmlns:a="http://schemas.openxmlformats.org/drawingml/2006/main" xmlns:r="http://schemas.openxmlformats.org/officeDocument/2006/relationships" xmlns:p="http://schemas.openxmlformats.org/presentationml/2006/main">
+  <p:cSld>
+    <p:spTree>
+      <p:nvGrpSpPr>
+        <p:cNvPr id="1" name=""/>
+        <p:cNvGrpSpPr/>
+        <p:nvPr/>
+      </p:nvGrpSpPr>
+      <p:grpSpPr>
+        <a:xfrm>
+          <a:off x="0" y="0"/>
+          <a:ext cx="0" cy="0"/>
+          <a:chOff x="0" y="0"/>
+          <a:chExt cx="0" cy="0"/>
+        </a:xfrm>
+      </p:grpSpPr>
+      <p:sp>
+        <p:nvSpPr>
+          <p:cNvPr id="2" name="Title 1"/>
+          <p:cNvSpPr>
+            <a:spLocks noGrp="1"/>
+          </p:cNvSpPr>
+          <p:nvPr>
+            <p:ph type="title"/>
+          </p:nvPr>
+        </p:nvSpPr>
+        <p:spPr/>
+        <p:txBody>
+          <a:bodyPr/>
+          <a:lstStyle/>
+          <a:p>
+            <a:pPr lvl="0" indent="0" marL="0">
+              <a:buNone/>
+            </a:pPr>
+            <a:r>
+              <a:rPr/>
+              <a:t>Comparación por género de la distribución de la felicidad</a:t>
+            </a:r>
+          </a:p>
+        </p:txBody>
+      </p:sp>
+      <p:pic>
+        <p:nvPicPr>
+          <p:cNvPr descr="Presentacion_Exit-To_files/figure-pptx/unnamed-chunk-4-1.png" id="0" name="Picture 1"/>
           <p:cNvPicPr>
             <a:picLocks noGrp="1" noChangeAspect="1"/>
           </p:cNvPicPr>

</xml_diff>

<commit_message>
Cambios antes de compartir con David Leiva
</commit_message>
<xml_diff>
--- a/05_Presentacion/Presentacion_Exit-To.pptx
+++ b/05_Presentacion/Presentacion_Exit-To.pptx
@@ -3176,7 +3176,7 @@
             </a:pPr>
             <a:r>
               <a:rPr/>
-              <a:t>2024-07-23</a:t>
+              <a:t>2024-07-24</a:t>
             </a:r>
           </a:p>
         </p:txBody>
@@ -3332,18 +3332,7 @@
             </a:pPr>
             <a:r>
               <a:rPr/>
-              <a:t>El número de datos es de</a:t>
-            </a:r>
-          </a:p>
-          <a:p>
-            <a:pPr lvl="0" indent="0">
-              <a:buNone/>
-            </a:pPr>
-            <a:r>
-              <a:rPr>
-                <a:latin typeface="Courier"/>
-              </a:rPr>
-              <a:t>## [1] 19452</a:t>
+              <a:t>El número de datos es de 19452.</a:t>
             </a:r>
           </a:p>
         </p:txBody>

</xml_diff>